<commit_message>
add images to presentation
</commit_message>
<xml_diff>
--- a/02-status-reports/20190606/fehle_halbhuber_sasse_predict_vr_movement.pptx
+++ b/02-status-reports/20190606/fehle_halbhuber_sasse_predict_vr_movement.pptx
@@ -5,17 +5,24 @@
     <p:sldMasterId id="2147483648" r:id="rId1"/>
   </p:sldMasterIdLst>
   <p:notesMasterIdLst>
-    <p:notesMasterId r:id="rId7"/>
+    <p:notesMasterId r:id="rId14"/>
   </p:notesMasterIdLst>
   <p:handoutMasterIdLst>
-    <p:handoutMasterId r:id="rId8"/>
+    <p:handoutMasterId r:id="rId15"/>
   </p:handoutMasterIdLst>
   <p:sldIdLst>
     <p:sldId id="258" r:id="rId2"/>
-    <p:sldId id="278" r:id="rId3"/>
-    <p:sldId id="279" r:id="rId4"/>
-    <p:sldId id="277" r:id="rId5"/>
-    <p:sldId id="273" r:id="rId6"/>
+    <p:sldId id="286" r:id="rId3"/>
+    <p:sldId id="288" r:id="rId4"/>
+    <p:sldId id="282" r:id="rId5"/>
+    <p:sldId id="283" r:id="rId6"/>
+    <p:sldId id="281" r:id="rId7"/>
+    <p:sldId id="287" r:id="rId8"/>
+    <p:sldId id="280" r:id="rId9"/>
+    <p:sldId id="285" r:id="rId10"/>
+    <p:sldId id="279" r:id="rId11"/>
+    <p:sldId id="277" r:id="rId12"/>
+    <p:sldId id="273" r:id="rId13"/>
   </p:sldIdLst>
   <p:sldSz cx="9144000" cy="6858000" type="screen4x3"/>
   <p:notesSz cx="6858000" cy="9144000"/>
@@ -120,7 +127,14 @@
         <p14:section name="Standardabschnitt" id="{F40A5D0B-1603-43F9-9E54-D260B8E47FF9}">
           <p14:sldIdLst>
             <p14:sldId id="258"/>
-            <p14:sldId id="278"/>
+            <p14:sldId id="286"/>
+            <p14:sldId id="288"/>
+            <p14:sldId id="282"/>
+            <p14:sldId id="283"/>
+            <p14:sldId id="281"/>
+            <p14:sldId id="287"/>
+            <p14:sldId id="280"/>
+            <p14:sldId id="285"/>
             <p14:sldId id="279"/>
             <p14:sldId id="277"/>
           </p14:sldIdLst>
@@ -182,8 +196,8 @@
     <cx:externalData r:id="rId1" cx:autoUpdate="0"/>
     <cx:data id="0">
       <cx:numDim type="val">
-        <cx:f>Tabelle1!$A$2:$A$77</cx:f>
-        <cx:lvl ptCount="76" formatCode="Standard">
+        <cx:f>Tabelle1!$A$2:$A$19</cx:f>
+        <cx:lvl ptCount="18" formatCode="Standard">
           <cx:pt idx="0">11</cx:pt>
           <cx:pt idx="1">13</cx:pt>
           <cx:pt idx="2">14</cx:pt>
@@ -209,32 +223,35 @@
   <cx:chart>
     <cx:title pos="t" align="ctr" overlay="0">
       <cx:tx>
-        <cx:rich>
-          <a:bodyPr spcFirstLastPara="1" vertOverflow="ellipsis" horzOverflow="overflow" wrap="square" lIns="0" tIns="0" rIns="0" bIns="0" anchor="ctr" anchorCtr="1"/>
-          <a:lstStyle/>
-          <a:p>
-            <a:pPr algn="ctr" rtl="0">
-              <a:defRPr/>
-            </a:pPr>
-            <a:r>
-              <a:rPr lang="de-DE" sz="1862" b="0" i="0" u="none" strike="noStrike" baseline="0">
-                <a:solidFill>
-                  <a:prstClr val="black">
-                    <a:lumMod val="65000"/>
-                    <a:lumOff val="35000"/>
-                  </a:prstClr>
-                </a:solidFill>
-                <a:latin typeface="Calibri"/>
-              </a:rPr>
-              <a:t>Latency Measurement Results</a:t>
-            </a:r>
-          </a:p>
-        </cx:rich>
+        <cx:txData>
+          <cx:v>Latency Measurement Results</cx:v>
+        </cx:txData>
       </cx:tx>
+      <cx:txPr>
+        <a:bodyPr spcFirstLastPara="1" vertOverflow="ellipsis" horzOverflow="overflow" wrap="square" lIns="0" tIns="0" rIns="0" bIns="0" anchor="ctr" anchorCtr="1"/>
+        <a:lstStyle/>
+        <a:p>
+          <a:pPr algn="ctr" rtl="0">
+            <a:defRPr/>
+          </a:pPr>
+          <a:r>
+            <a:rPr lang="de-DE" sz="1862" b="0" i="0" u="none" strike="noStrike" baseline="0">
+              <a:solidFill>
+                <a:prstClr val="black">
+                  <a:lumMod val="65000"/>
+                  <a:lumOff val="35000"/>
+                </a:prstClr>
+              </a:solidFill>
+              <a:latin typeface="Calibri"/>
+            </a:rPr>
+            <a:t>Latency Measurement Results</a:t>
+          </a:r>
+        </a:p>
+      </cx:txPr>
     </cx:title>
     <cx:plotArea>
       <cx:plotAreaRegion>
-        <cx:series layoutId="clusteredColumn" uniqueId="{DF9CC5CA-1566-4F7D-9C67-C751AF3D59A2}">
+        <cx:series layoutId="clusteredColumn" uniqueId="{00000005-6A6F-4F67-8AAB-E80693348689}">
           <cx:tx>
             <cx:txData>
               <cx:f>Tabelle1!$A$1</cx:f>
@@ -248,7 +265,7 @@
         </cx:series>
       </cx:plotAreaRegion>
       <cx:axis id="0">
-        <cx:catScaling gapWidth="0"/>
+        <cx:catScaling gapWidth="0.0500000007"/>
         <cx:tickLabels/>
       </cx:axis>
       <cx:axis id="1">
@@ -1471,7 +1488,7 @@
             <a:fld id="{C7C1E745-E753-4EB9-8485-6560CD204B37}" type="slidenum">
               <a:rPr lang="de-DE" smtClean="0"/>
               <a:pPr/>
-              <a:t>4</a:t>
+              <a:t>11</a:t>
             </a:fld>
             <a:endParaRPr lang="de-DE"/>
           </a:p>
@@ -3346,120 +3363,7 @@
 </p:sld>
 </file>
 
-<file path=ppt/slides/slide2.xml><?xml version="1.0" encoding="utf-8"?>
-<p:sld xmlns:a="http://schemas.openxmlformats.org/drawingml/2006/main" xmlns:r="http://schemas.openxmlformats.org/officeDocument/2006/relationships" xmlns:p="http://schemas.openxmlformats.org/presentationml/2006/main">
-  <p:cSld>
-    <p:spTree>
-      <p:nvGrpSpPr>
-        <p:cNvPr id="1" name=""/>
-        <p:cNvGrpSpPr/>
-        <p:nvPr/>
-      </p:nvGrpSpPr>
-      <p:grpSpPr>
-        <a:xfrm>
-          <a:off x="0" y="0"/>
-          <a:ext cx="0" cy="0"/>
-          <a:chOff x="0" y="0"/>
-          <a:chExt cx="0" cy="0"/>
-        </a:xfrm>
-      </p:grpSpPr>
-      <p:sp>
-        <p:nvSpPr>
-          <p:cNvPr id="2" name="Titel 1">
-            <a:extLst>
-              <a:ext uri="{FF2B5EF4-FFF2-40B4-BE49-F238E27FC236}">
-                <a16:creationId xmlns:a16="http://schemas.microsoft.com/office/drawing/2014/main" id="{5FE68724-AEE1-410A-A646-EBF5BFF66344}"/>
-              </a:ext>
-            </a:extLst>
-          </p:cNvPr>
-          <p:cNvSpPr>
-            <a:spLocks noGrp="1"/>
-          </p:cNvSpPr>
-          <p:nvPr>
-            <p:ph type="title"/>
-          </p:nvPr>
-        </p:nvSpPr>
-        <p:spPr/>
-        <p:txBody>
-          <a:bodyPr/>
-          <a:lstStyle/>
-          <a:p>
-            <a:r>
-              <a:rPr lang="de-DE"/>
-              <a:t>Latency Test Framework</a:t>
-            </a:r>
-            <a:endParaRPr lang="en-US"/>
-          </a:p>
-        </p:txBody>
-      </p:sp>
-      <p:sp>
-        <p:nvSpPr>
-          <p:cNvPr id="3" name="Inhaltsplatzhalter 2">
-            <a:extLst>
-              <a:ext uri="{FF2B5EF4-FFF2-40B4-BE49-F238E27FC236}">
-                <a16:creationId xmlns:a16="http://schemas.microsoft.com/office/drawing/2014/main" id="{8CE82B4C-CA1B-4A04-974B-CFE33970AE50}"/>
-              </a:ext>
-            </a:extLst>
-          </p:cNvPr>
-          <p:cNvSpPr>
-            <a:spLocks noGrp="1"/>
-          </p:cNvSpPr>
-          <p:nvPr>
-            <p:ph sz="half" idx="1"/>
-          </p:nvPr>
-        </p:nvSpPr>
-        <p:spPr/>
-        <p:txBody>
-          <a:bodyPr/>
-          <a:lstStyle/>
-          <a:p>
-            <a:endParaRPr lang="en-US"/>
-          </a:p>
-        </p:txBody>
-      </p:sp>
-      <p:sp>
-        <p:nvSpPr>
-          <p:cNvPr id="4" name="Foliennummernplatzhalter 3">
-            <a:extLst>
-              <a:ext uri="{FF2B5EF4-FFF2-40B4-BE49-F238E27FC236}">
-                <a16:creationId xmlns:a16="http://schemas.microsoft.com/office/drawing/2014/main" id="{5DFDBFB6-BAC4-41BB-87E0-7CD02CAD6D17}"/>
-              </a:ext>
-            </a:extLst>
-          </p:cNvPr>
-          <p:cNvSpPr>
-            <a:spLocks noGrp="1"/>
-          </p:cNvSpPr>
-          <p:nvPr>
-            <p:ph type="sldNum" sz="quarter" idx="10"/>
-          </p:nvPr>
-        </p:nvSpPr>
-        <p:spPr/>
-        <p:txBody>
-          <a:bodyPr/>
-          <a:lstStyle/>
-          <a:p>
-            <a:fld id="{9BBAE405-9238-4745-AB75-58013C9D9462}" type="slidenum">
-              <a:rPr lang="de-DE" smtClean="0"/>
-              <a:t>2</a:t>
-            </a:fld>
-            <a:endParaRPr lang="de-DE" dirty="0"/>
-          </a:p>
-        </p:txBody>
-      </p:sp>
-    </p:spTree>
-    <p:extLst>
-      <p:ext uri="{BB962C8B-B14F-4D97-AF65-F5344CB8AC3E}">
-        <p14:creationId xmlns:p14="http://schemas.microsoft.com/office/powerpoint/2010/main" val="2248211748"/>
-      </p:ext>
-    </p:extLst>
-  </p:cSld>
-  <p:clrMapOvr>
-    <a:masterClrMapping/>
-  </p:clrMapOvr>
-</p:sld>
-</file>
-
-<file path=ppt/slides/slide3.xml><?xml version="1.0" encoding="utf-8"?>
+<file path=ppt/slides/slide10.xml><?xml version="1.0" encoding="utf-8"?>
 <p:sld xmlns:a="http://schemas.openxmlformats.org/drawingml/2006/main" xmlns:r="http://schemas.openxmlformats.org/officeDocument/2006/relationships" xmlns:p="http://schemas.openxmlformats.org/presentationml/2006/main">
   <p:cSld>
     <p:spTree>
@@ -3523,7 +3427,7 @@
                 <p:ph sz="half" idx="1"/>
                 <p:extLst>
                   <p:ext uri="{D42A27DB-BD31-4B8C-83A1-F6EECF244321}">
-                    <p14:modId xmlns:p14="http://schemas.microsoft.com/office/powerpoint/2010/main" val="3968631957"/>
+                    <p14:modId xmlns:p14="http://schemas.microsoft.com/office/powerpoint/2010/main" val="3752747343"/>
                   </p:ext>
                 </p:extLst>
               </p:nvPr>
@@ -3595,7 +3499,7 @@
           <a:p>
             <a:fld id="{9BBAE405-9238-4745-AB75-58013C9D9462}" type="slidenum">
               <a:rPr lang="de-DE" smtClean="0"/>
-              <a:t>3</a:t>
+              <a:t>10</a:t>
             </a:fld>
             <a:endParaRPr lang="de-DE" dirty="0"/>
           </a:p>
@@ -3614,7 +3518,7 @@
 </p:sld>
 </file>
 
-<file path=ppt/slides/slide4.xml><?xml version="1.0" encoding="utf-8"?>
+<file path=ppt/slides/slide11.xml><?xml version="1.0" encoding="utf-8"?>
 <p:sld xmlns:a="http://schemas.openxmlformats.org/drawingml/2006/main" xmlns:r="http://schemas.openxmlformats.org/officeDocument/2006/relationships" xmlns:p="http://schemas.openxmlformats.org/presentationml/2006/main">
   <p:cSld>
     <p:spTree>
@@ -3683,7 +3587,7 @@
           <a:p>
             <a:fld id="{9BBAE405-9238-4745-AB75-58013C9D9462}" type="slidenum">
               <a:rPr lang="de-DE" smtClean="0"/>
-              <a:t>4</a:t>
+              <a:t>11</a:t>
             </a:fld>
             <a:endParaRPr lang="de-DE" dirty="0"/>
           </a:p>
@@ -3762,7 +3666,7 @@
 </p:sld>
 </file>
 
-<file path=ppt/slides/slide5.xml><?xml version="1.0" encoding="utf-8"?>
+<file path=ppt/slides/slide12.xml><?xml version="1.0" encoding="utf-8"?>
 <p:sld xmlns:a="http://schemas.openxmlformats.org/drawingml/2006/main" xmlns:r="http://schemas.openxmlformats.org/officeDocument/2006/relationships" xmlns:p="http://schemas.openxmlformats.org/presentationml/2006/main">
   <p:cSld>
     <p:spTree>
@@ -3849,7 +3753,7 @@
           <a:p>
             <a:fld id="{9BBAE405-9238-4745-AB75-58013C9D9462}" type="slidenum">
               <a:rPr lang="de-DE" smtClean="0"/>
-              <a:t>5</a:t>
+              <a:t>12</a:t>
             </a:fld>
             <a:endParaRPr lang="de-DE" dirty="0"/>
           </a:p>
@@ -3898,6 +3802,990 @@
     <p:extLst>
       <p:ext uri="{BB962C8B-B14F-4D97-AF65-F5344CB8AC3E}">
         <p14:creationId xmlns:p14="http://schemas.microsoft.com/office/powerpoint/2010/main" val="2109670464"/>
+      </p:ext>
+    </p:extLst>
+  </p:cSld>
+  <p:clrMapOvr>
+    <a:masterClrMapping/>
+  </p:clrMapOvr>
+</p:sld>
+</file>
+
+<file path=ppt/slides/slide2.xml><?xml version="1.0" encoding="utf-8"?>
+<p:sld xmlns:a="http://schemas.openxmlformats.org/drawingml/2006/main" xmlns:r="http://schemas.openxmlformats.org/officeDocument/2006/relationships" xmlns:p="http://schemas.openxmlformats.org/presentationml/2006/main">
+  <p:cSld>
+    <p:spTree>
+      <p:nvGrpSpPr>
+        <p:cNvPr id="1" name=""/>
+        <p:cNvGrpSpPr/>
+        <p:nvPr/>
+      </p:nvGrpSpPr>
+      <p:grpSpPr>
+        <a:xfrm>
+          <a:off x="0" y="0"/>
+          <a:ext cx="0" cy="0"/>
+          <a:chOff x="0" y="0"/>
+          <a:chExt cx="0" cy="0"/>
+        </a:xfrm>
+      </p:grpSpPr>
+      <p:sp>
+        <p:nvSpPr>
+          <p:cNvPr id="2" name="Titel 1">
+            <a:extLst>
+              <a:ext uri="{FF2B5EF4-FFF2-40B4-BE49-F238E27FC236}">
+                <a16:creationId xmlns:a16="http://schemas.microsoft.com/office/drawing/2014/main" id="{5FE68724-AEE1-410A-A646-EBF5BFF66344}"/>
+              </a:ext>
+            </a:extLst>
+          </p:cNvPr>
+          <p:cNvSpPr>
+            <a:spLocks noGrp="1"/>
+          </p:cNvSpPr>
+          <p:nvPr>
+            <p:ph type="title"/>
+          </p:nvPr>
+        </p:nvSpPr>
+        <p:spPr/>
+        <p:txBody>
+          <a:bodyPr/>
+          <a:lstStyle/>
+          <a:p>
+            <a:r>
+              <a:rPr lang="de-DE"/>
+              <a:t>Latency Test Framework</a:t>
+            </a:r>
+            <a:endParaRPr lang="en-US"/>
+          </a:p>
+        </p:txBody>
+      </p:sp>
+      <p:sp>
+        <p:nvSpPr>
+          <p:cNvPr id="4" name="Foliennummernplatzhalter 3">
+            <a:extLst>
+              <a:ext uri="{FF2B5EF4-FFF2-40B4-BE49-F238E27FC236}">
+                <a16:creationId xmlns:a16="http://schemas.microsoft.com/office/drawing/2014/main" id="{5DFDBFB6-BAC4-41BB-87E0-7CD02CAD6D17}"/>
+              </a:ext>
+            </a:extLst>
+          </p:cNvPr>
+          <p:cNvSpPr>
+            <a:spLocks noGrp="1"/>
+          </p:cNvSpPr>
+          <p:nvPr>
+            <p:ph type="sldNum" sz="quarter" idx="10"/>
+          </p:nvPr>
+        </p:nvSpPr>
+        <p:spPr/>
+        <p:txBody>
+          <a:bodyPr/>
+          <a:lstStyle/>
+          <a:p>
+            <a:fld id="{9BBAE405-9238-4745-AB75-58013C9D9462}" type="slidenum">
+              <a:rPr lang="de-DE" smtClean="0"/>
+              <a:t>2</a:t>
+            </a:fld>
+            <a:endParaRPr lang="de-DE" dirty="0"/>
+          </a:p>
+        </p:txBody>
+      </p:sp>
+      <p:pic>
+        <p:nvPicPr>
+          <p:cNvPr id="6" name="Inhaltsplatzhalter 5" descr="Ein Bild, das Elektronik enthält.&#10;&#10;Automatisch generierte Beschreibung">
+            <a:extLst>
+              <a:ext uri="{FF2B5EF4-FFF2-40B4-BE49-F238E27FC236}">
+                <a16:creationId xmlns:a16="http://schemas.microsoft.com/office/drawing/2014/main" id="{AA9ABB58-C7B4-43C4-9FE1-A6F907462AA4}"/>
+              </a:ext>
+            </a:extLst>
+          </p:cNvPr>
+          <p:cNvPicPr>
+            <a:picLocks noGrp="1" noChangeAspect="1"/>
+          </p:cNvPicPr>
+          <p:nvPr>
+            <p:ph sz="half" idx="1"/>
+          </p:nvPr>
+        </p:nvPicPr>
+        <p:blipFill>
+          <a:blip r:embed="rId2" cstate="print">
+            <a:extLst>
+              <a:ext uri="{28A0092B-C50C-407E-A947-70E740481C1C}">
+                <a14:useLocalDpi xmlns:a14="http://schemas.microsoft.com/office/drawing/2010/main" val="0"/>
+              </a:ext>
+            </a:extLst>
+          </a:blip>
+          <a:stretch>
+            <a:fillRect/>
+          </a:stretch>
+        </p:blipFill>
+        <p:spPr>
+          <a:xfrm>
+            <a:off x="3446129" y="2339975"/>
+            <a:ext cx="2972467" cy="3960813"/>
+          </a:xfrm>
+        </p:spPr>
+      </p:pic>
+    </p:spTree>
+    <p:extLst>
+      <p:ext uri="{BB962C8B-B14F-4D97-AF65-F5344CB8AC3E}">
+        <p14:creationId xmlns:p14="http://schemas.microsoft.com/office/powerpoint/2010/main" val="3251310878"/>
+      </p:ext>
+    </p:extLst>
+  </p:cSld>
+  <p:clrMapOvr>
+    <a:masterClrMapping/>
+  </p:clrMapOvr>
+</p:sld>
+</file>
+
+<file path=ppt/slides/slide3.xml><?xml version="1.0" encoding="utf-8"?>
+<p:sld xmlns:a="http://schemas.openxmlformats.org/drawingml/2006/main" xmlns:r="http://schemas.openxmlformats.org/officeDocument/2006/relationships" xmlns:p="http://schemas.openxmlformats.org/presentationml/2006/main">
+  <p:cSld>
+    <p:spTree>
+      <p:nvGrpSpPr>
+        <p:cNvPr id="1" name=""/>
+        <p:cNvGrpSpPr/>
+        <p:nvPr/>
+      </p:nvGrpSpPr>
+      <p:grpSpPr>
+        <a:xfrm>
+          <a:off x="0" y="0"/>
+          <a:ext cx="0" cy="0"/>
+          <a:chOff x="0" y="0"/>
+          <a:chExt cx="0" cy="0"/>
+        </a:xfrm>
+      </p:grpSpPr>
+      <p:sp>
+        <p:nvSpPr>
+          <p:cNvPr id="2" name="Titel 1">
+            <a:extLst>
+              <a:ext uri="{FF2B5EF4-FFF2-40B4-BE49-F238E27FC236}">
+                <a16:creationId xmlns:a16="http://schemas.microsoft.com/office/drawing/2014/main" id="{5FE68724-AEE1-410A-A646-EBF5BFF66344}"/>
+              </a:ext>
+            </a:extLst>
+          </p:cNvPr>
+          <p:cNvSpPr>
+            <a:spLocks noGrp="1"/>
+          </p:cNvSpPr>
+          <p:nvPr>
+            <p:ph type="title"/>
+          </p:nvPr>
+        </p:nvSpPr>
+        <p:spPr/>
+        <p:txBody>
+          <a:bodyPr/>
+          <a:lstStyle/>
+          <a:p>
+            <a:r>
+              <a:rPr lang="de-DE"/>
+              <a:t>Latency Test Framework</a:t>
+            </a:r>
+            <a:endParaRPr lang="en-US"/>
+          </a:p>
+        </p:txBody>
+      </p:sp>
+      <p:sp>
+        <p:nvSpPr>
+          <p:cNvPr id="4" name="Foliennummernplatzhalter 3">
+            <a:extLst>
+              <a:ext uri="{FF2B5EF4-FFF2-40B4-BE49-F238E27FC236}">
+                <a16:creationId xmlns:a16="http://schemas.microsoft.com/office/drawing/2014/main" id="{5DFDBFB6-BAC4-41BB-87E0-7CD02CAD6D17}"/>
+              </a:ext>
+            </a:extLst>
+          </p:cNvPr>
+          <p:cNvSpPr>
+            <a:spLocks noGrp="1"/>
+          </p:cNvSpPr>
+          <p:nvPr>
+            <p:ph type="sldNum" sz="quarter" idx="10"/>
+          </p:nvPr>
+        </p:nvSpPr>
+        <p:spPr/>
+        <p:txBody>
+          <a:bodyPr/>
+          <a:lstStyle/>
+          <a:p>
+            <a:fld id="{9BBAE405-9238-4745-AB75-58013C9D9462}" type="slidenum">
+              <a:rPr lang="de-DE" smtClean="0"/>
+              <a:t>3</a:t>
+            </a:fld>
+            <a:endParaRPr lang="de-DE" dirty="0"/>
+          </a:p>
+        </p:txBody>
+      </p:sp>
+      <p:pic>
+        <p:nvPicPr>
+          <p:cNvPr id="6" name="Inhaltsplatzhalter 5" descr="Ein Bild, das drinnen, Computer, Elektronik, Laptop enthält.&#10;&#10;Automatisch generierte Beschreibung">
+            <a:extLst>
+              <a:ext uri="{FF2B5EF4-FFF2-40B4-BE49-F238E27FC236}">
+                <a16:creationId xmlns:a16="http://schemas.microsoft.com/office/drawing/2014/main" id="{02E6506A-8BB9-4932-B398-4C9B02F0C119}"/>
+              </a:ext>
+            </a:extLst>
+          </p:cNvPr>
+          <p:cNvPicPr>
+            <a:picLocks noGrp="1" noChangeAspect="1"/>
+          </p:cNvPicPr>
+          <p:nvPr>
+            <p:ph sz="half" idx="1"/>
+          </p:nvPr>
+        </p:nvPicPr>
+        <p:blipFill>
+          <a:blip r:embed="rId2" cstate="print">
+            <a:extLst>
+              <a:ext uri="{28A0092B-C50C-407E-A947-70E740481C1C}">
+                <a14:useLocalDpi xmlns:a14="http://schemas.microsoft.com/office/drawing/2010/main" val="0"/>
+              </a:ext>
+            </a:extLst>
+          </a:blip>
+          <a:stretch>
+            <a:fillRect/>
+          </a:stretch>
+        </p:blipFill>
+        <p:spPr>
+          <a:xfrm>
+            <a:off x="3446129" y="2339975"/>
+            <a:ext cx="2972467" cy="3960813"/>
+          </a:xfrm>
+        </p:spPr>
+      </p:pic>
+    </p:spTree>
+    <p:extLst>
+      <p:ext uri="{BB962C8B-B14F-4D97-AF65-F5344CB8AC3E}">
+        <p14:creationId xmlns:p14="http://schemas.microsoft.com/office/powerpoint/2010/main" val="3887799259"/>
+      </p:ext>
+    </p:extLst>
+  </p:cSld>
+  <p:clrMapOvr>
+    <a:masterClrMapping/>
+  </p:clrMapOvr>
+</p:sld>
+</file>
+
+<file path=ppt/slides/slide4.xml><?xml version="1.0" encoding="utf-8"?>
+<p:sld xmlns:a="http://schemas.openxmlformats.org/drawingml/2006/main" xmlns:r="http://schemas.openxmlformats.org/officeDocument/2006/relationships" xmlns:p="http://schemas.openxmlformats.org/presentationml/2006/main">
+  <p:cSld>
+    <p:spTree>
+      <p:nvGrpSpPr>
+        <p:cNvPr id="1" name=""/>
+        <p:cNvGrpSpPr/>
+        <p:nvPr/>
+      </p:nvGrpSpPr>
+      <p:grpSpPr>
+        <a:xfrm>
+          <a:off x="0" y="0"/>
+          <a:ext cx="0" cy="0"/>
+          <a:chOff x="0" y="0"/>
+          <a:chExt cx="0" cy="0"/>
+        </a:xfrm>
+      </p:grpSpPr>
+      <p:sp>
+        <p:nvSpPr>
+          <p:cNvPr id="2" name="Titel 1">
+            <a:extLst>
+              <a:ext uri="{FF2B5EF4-FFF2-40B4-BE49-F238E27FC236}">
+                <a16:creationId xmlns:a16="http://schemas.microsoft.com/office/drawing/2014/main" id="{5FE68724-AEE1-410A-A646-EBF5BFF66344}"/>
+              </a:ext>
+            </a:extLst>
+          </p:cNvPr>
+          <p:cNvSpPr>
+            <a:spLocks noGrp="1"/>
+          </p:cNvSpPr>
+          <p:nvPr>
+            <p:ph type="title"/>
+          </p:nvPr>
+        </p:nvSpPr>
+        <p:spPr/>
+        <p:txBody>
+          <a:bodyPr/>
+          <a:lstStyle/>
+          <a:p>
+            <a:r>
+              <a:rPr lang="de-DE"/>
+              <a:t>Latency Test Framework</a:t>
+            </a:r>
+            <a:endParaRPr lang="en-US"/>
+          </a:p>
+        </p:txBody>
+      </p:sp>
+      <p:sp>
+        <p:nvSpPr>
+          <p:cNvPr id="4" name="Foliennummernplatzhalter 3">
+            <a:extLst>
+              <a:ext uri="{FF2B5EF4-FFF2-40B4-BE49-F238E27FC236}">
+                <a16:creationId xmlns:a16="http://schemas.microsoft.com/office/drawing/2014/main" id="{5DFDBFB6-BAC4-41BB-87E0-7CD02CAD6D17}"/>
+              </a:ext>
+            </a:extLst>
+          </p:cNvPr>
+          <p:cNvSpPr>
+            <a:spLocks noGrp="1"/>
+          </p:cNvSpPr>
+          <p:nvPr>
+            <p:ph type="sldNum" sz="quarter" idx="10"/>
+          </p:nvPr>
+        </p:nvSpPr>
+        <p:spPr/>
+        <p:txBody>
+          <a:bodyPr/>
+          <a:lstStyle/>
+          <a:p>
+            <a:fld id="{9BBAE405-9238-4745-AB75-58013C9D9462}" type="slidenum">
+              <a:rPr lang="de-DE" smtClean="0"/>
+              <a:t>4</a:t>
+            </a:fld>
+            <a:endParaRPr lang="de-DE" dirty="0"/>
+          </a:p>
+        </p:txBody>
+      </p:sp>
+      <p:pic>
+        <p:nvPicPr>
+          <p:cNvPr id="6" name="Inhaltsplatzhalter 5" descr="Ein Bild, das Boden, sitzend, Kraftrad, drinnen enthält.&#10;&#10;Automatisch generierte Beschreibung">
+            <a:extLst>
+              <a:ext uri="{FF2B5EF4-FFF2-40B4-BE49-F238E27FC236}">
+                <a16:creationId xmlns:a16="http://schemas.microsoft.com/office/drawing/2014/main" id="{B8075730-2144-4176-B87F-FA2BA23A94FE}"/>
+              </a:ext>
+            </a:extLst>
+          </p:cNvPr>
+          <p:cNvPicPr>
+            <a:picLocks noGrp="1" noChangeAspect="1"/>
+          </p:cNvPicPr>
+          <p:nvPr>
+            <p:ph sz="half" idx="1"/>
+          </p:nvPr>
+        </p:nvPicPr>
+        <p:blipFill>
+          <a:blip r:embed="rId2" cstate="print">
+            <a:extLst>
+              <a:ext uri="{28A0092B-C50C-407E-A947-70E740481C1C}">
+                <a14:useLocalDpi xmlns:a14="http://schemas.microsoft.com/office/drawing/2010/main" val="0"/>
+              </a:ext>
+            </a:extLst>
+          </a:blip>
+          <a:stretch>
+            <a:fillRect/>
+          </a:stretch>
+        </p:blipFill>
+        <p:spPr>
+          <a:xfrm>
+            <a:off x="3446129" y="2339975"/>
+            <a:ext cx="2972467" cy="3960813"/>
+          </a:xfrm>
+        </p:spPr>
+      </p:pic>
+    </p:spTree>
+    <p:extLst>
+      <p:ext uri="{BB962C8B-B14F-4D97-AF65-F5344CB8AC3E}">
+        <p14:creationId xmlns:p14="http://schemas.microsoft.com/office/powerpoint/2010/main" val="3960979593"/>
+      </p:ext>
+    </p:extLst>
+  </p:cSld>
+  <p:clrMapOvr>
+    <a:masterClrMapping/>
+  </p:clrMapOvr>
+</p:sld>
+</file>
+
+<file path=ppt/slides/slide5.xml><?xml version="1.0" encoding="utf-8"?>
+<p:sld xmlns:a="http://schemas.openxmlformats.org/drawingml/2006/main" xmlns:r="http://schemas.openxmlformats.org/officeDocument/2006/relationships" xmlns:p="http://schemas.openxmlformats.org/presentationml/2006/main">
+  <p:cSld>
+    <p:spTree>
+      <p:nvGrpSpPr>
+        <p:cNvPr id="1" name=""/>
+        <p:cNvGrpSpPr/>
+        <p:nvPr/>
+      </p:nvGrpSpPr>
+      <p:grpSpPr>
+        <a:xfrm>
+          <a:off x="0" y="0"/>
+          <a:ext cx="0" cy="0"/>
+          <a:chOff x="0" y="0"/>
+          <a:chExt cx="0" cy="0"/>
+        </a:xfrm>
+      </p:grpSpPr>
+      <p:sp>
+        <p:nvSpPr>
+          <p:cNvPr id="2" name="Titel 1">
+            <a:extLst>
+              <a:ext uri="{FF2B5EF4-FFF2-40B4-BE49-F238E27FC236}">
+                <a16:creationId xmlns:a16="http://schemas.microsoft.com/office/drawing/2014/main" id="{5FE68724-AEE1-410A-A646-EBF5BFF66344}"/>
+              </a:ext>
+            </a:extLst>
+          </p:cNvPr>
+          <p:cNvSpPr>
+            <a:spLocks noGrp="1"/>
+          </p:cNvSpPr>
+          <p:nvPr>
+            <p:ph type="title"/>
+          </p:nvPr>
+        </p:nvSpPr>
+        <p:spPr/>
+        <p:txBody>
+          <a:bodyPr/>
+          <a:lstStyle/>
+          <a:p>
+            <a:r>
+              <a:rPr lang="de-DE"/>
+              <a:t>Latency Test Framework</a:t>
+            </a:r>
+            <a:endParaRPr lang="en-US"/>
+          </a:p>
+        </p:txBody>
+      </p:sp>
+      <p:sp>
+        <p:nvSpPr>
+          <p:cNvPr id="4" name="Foliennummernplatzhalter 3">
+            <a:extLst>
+              <a:ext uri="{FF2B5EF4-FFF2-40B4-BE49-F238E27FC236}">
+                <a16:creationId xmlns:a16="http://schemas.microsoft.com/office/drawing/2014/main" id="{5DFDBFB6-BAC4-41BB-87E0-7CD02CAD6D17}"/>
+              </a:ext>
+            </a:extLst>
+          </p:cNvPr>
+          <p:cNvSpPr>
+            <a:spLocks noGrp="1"/>
+          </p:cNvSpPr>
+          <p:nvPr>
+            <p:ph type="sldNum" sz="quarter" idx="10"/>
+          </p:nvPr>
+        </p:nvSpPr>
+        <p:spPr/>
+        <p:txBody>
+          <a:bodyPr/>
+          <a:lstStyle/>
+          <a:p>
+            <a:fld id="{9BBAE405-9238-4745-AB75-58013C9D9462}" type="slidenum">
+              <a:rPr lang="de-DE" smtClean="0"/>
+              <a:t>5</a:t>
+            </a:fld>
+            <a:endParaRPr lang="de-DE" dirty="0"/>
+          </a:p>
+        </p:txBody>
+      </p:sp>
+      <p:pic>
+        <p:nvPicPr>
+          <p:cNvPr id="6" name="Inhaltsplatzhalter 5" descr="Ein Bild, das drinnen, Tisch, Boden enthält.&#10;&#10;Automatisch generierte Beschreibung">
+            <a:extLst>
+              <a:ext uri="{FF2B5EF4-FFF2-40B4-BE49-F238E27FC236}">
+                <a16:creationId xmlns:a16="http://schemas.microsoft.com/office/drawing/2014/main" id="{0F679551-FAD4-4251-80F2-B4880AEE7A01}"/>
+              </a:ext>
+            </a:extLst>
+          </p:cNvPr>
+          <p:cNvPicPr>
+            <a:picLocks noGrp="1" noChangeAspect="1"/>
+          </p:cNvPicPr>
+          <p:nvPr>
+            <p:ph sz="half" idx="1"/>
+          </p:nvPr>
+        </p:nvPicPr>
+        <p:blipFill>
+          <a:blip r:embed="rId2" cstate="print">
+            <a:extLst>
+              <a:ext uri="{28A0092B-C50C-407E-A947-70E740481C1C}">
+                <a14:useLocalDpi xmlns:a14="http://schemas.microsoft.com/office/drawing/2010/main" val="0"/>
+              </a:ext>
+            </a:extLst>
+          </a:blip>
+          <a:stretch>
+            <a:fillRect/>
+          </a:stretch>
+        </p:blipFill>
+        <p:spPr>
+          <a:xfrm>
+            <a:off x="3446129" y="2339975"/>
+            <a:ext cx="2972467" cy="3960813"/>
+          </a:xfrm>
+        </p:spPr>
+      </p:pic>
+    </p:spTree>
+    <p:extLst>
+      <p:ext uri="{BB962C8B-B14F-4D97-AF65-F5344CB8AC3E}">
+        <p14:creationId xmlns:p14="http://schemas.microsoft.com/office/powerpoint/2010/main" val="2272270349"/>
+      </p:ext>
+    </p:extLst>
+  </p:cSld>
+  <p:clrMapOvr>
+    <a:masterClrMapping/>
+  </p:clrMapOvr>
+</p:sld>
+</file>
+
+<file path=ppt/slides/slide6.xml><?xml version="1.0" encoding="utf-8"?>
+<p:sld xmlns:a="http://schemas.openxmlformats.org/drawingml/2006/main" xmlns:r="http://schemas.openxmlformats.org/officeDocument/2006/relationships" xmlns:p="http://schemas.openxmlformats.org/presentationml/2006/main">
+  <p:cSld>
+    <p:spTree>
+      <p:nvGrpSpPr>
+        <p:cNvPr id="1" name=""/>
+        <p:cNvGrpSpPr/>
+        <p:nvPr/>
+      </p:nvGrpSpPr>
+      <p:grpSpPr>
+        <a:xfrm>
+          <a:off x="0" y="0"/>
+          <a:ext cx="0" cy="0"/>
+          <a:chOff x="0" y="0"/>
+          <a:chExt cx="0" cy="0"/>
+        </a:xfrm>
+      </p:grpSpPr>
+      <p:sp>
+        <p:nvSpPr>
+          <p:cNvPr id="2" name="Titel 1">
+            <a:extLst>
+              <a:ext uri="{FF2B5EF4-FFF2-40B4-BE49-F238E27FC236}">
+                <a16:creationId xmlns:a16="http://schemas.microsoft.com/office/drawing/2014/main" id="{5FE68724-AEE1-410A-A646-EBF5BFF66344}"/>
+              </a:ext>
+            </a:extLst>
+          </p:cNvPr>
+          <p:cNvSpPr>
+            <a:spLocks noGrp="1"/>
+          </p:cNvSpPr>
+          <p:nvPr>
+            <p:ph type="title"/>
+          </p:nvPr>
+        </p:nvSpPr>
+        <p:spPr/>
+        <p:txBody>
+          <a:bodyPr/>
+          <a:lstStyle/>
+          <a:p>
+            <a:r>
+              <a:rPr lang="de-DE"/>
+              <a:t>Latency Test Framework</a:t>
+            </a:r>
+            <a:endParaRPr lang="en-US"/>
+          </a:p>
+        </p:txBody>
+      </p:sp>
+      <p:sp>
+        <p:nvSpPr>
+          <p:cNvPr id="4" name="Foliennummernplatzhalter 3">
+            <a:extLst>
+              <a:ext uri="{FF2B5EF4-FFF2-40B4-BE49-F238E27FC236}">
+                <a16:creationId xmlns:a16="http://schemas.microsoft.com/office/drawing/2014/main" id="{5DFDBFB6-BAC4-41BB-87E0-7CD02CAD6D17}"/>
+              </a:ext>
+            </a:extLst>
+          </p:cNvPr>
+          <p:cNvSpPr>
+            <a:spLocks noGrp="1"/>
+          </p:cNvSpPr>
+          <p:nvPr>
+            <p:ph type="sldNum" sz="quarter" idx="10"/>
+          </p:nvPr>
+        </p:nvSpPr>
+        <p:spPr/>
+        <p:txBody>
+          <a:bodyPr/>
+          <a:lstStyle/>
+          <a:p>
+            <a:fld id="{9BBAE405-9238-4745-AB75-58013C9D9462}" type="slidenum">
+              <a:rPr lang="de-DE" smtClean="0"/>
+              <a:t>6</a:t>
+            </a:fld>
+            <a:endParaRPr lang="de-DE" dirty="0"/>
+          </a:p>
+        </p:txBody>
+      </p:sp>
+      <p:pic>
+        <p:nvPicPr>
+          <p:cNvPr id="6" name="Inhaltsplatzhalter 5" descr="Ein Bild, das Boden enthält.&#10;&#10;Automatisch generierte Beschreibung">
+            <a:extLst>
+              <a:ext uri="{FF2B5EF4-FFF2-40B4-BE49-F238E27FC236}">
+                <a16:creationId xmlns:a16="http://schemas.microsoft.com/office/drawing/2014/main" id="{CA0F9107-0F10-44BC-A765-DBBC3FC1F5AD}"/>
+              </a:ext>
+            </a:extLst>
+          </p:cNvPr>
+          <p:cNvPicPr>
+            <a:picLocks noGrp="1" noChangeAspect="1"/>
+          </p:cNvPicPr>
+          <p:nvPr>
+            <p:ph sz="half" idx="1"/>
+          </p:nvPr>
+        </p:nvPicPr>
+        <p:blipFill>
+          <a:blip r:embed="rId2" cstate="print">
+            <a:extLst>
+              <a:ext uri="{28A0092B-C50C-407E-A947-70E740481C1C}">
+                <a14:useLocalDpi xmlns:a14="http://schemas.microsoft.com/office/drawing/2010/main" val="0"/>
+              </a:ext>
+            </a:extLst>
+          </a:blip>
+          <a:stretch>
+            <a:fillRect/>
+          </a:stretch>
+        </p:blipFill>
+        <p:spPr>
+          <a:xfrm>
+            <a:off x="3446129" y="2339975"/>
+            <a:ext cx="2972467" cy="3960813"/>
+          </a:xfrm>
+        </p:spPr>
+      </p:pic>
+    </p:spTree>
+    <p:extLst>
+      <p:ext uri="{BB962C8B-B14F-4D97-AF65-F5344CB8AC3E}">
+        <p14:creationId xmlns:p14="http://schemas.microsoft.com/office/powerpoint/2010/main" val="3075917840"/>
+      </p:ext>
+    </p:extLst>
+  </p:cSld>
+  <p:clrMapOvr>
+    <a:masterClrMapping/>
+  </p:clrMapOvr>
+</p:sld>
+</file>
+
+<file path=ppt/slides/slide7.xml><?xml version="1.0" encoding="utf-8"?>
+<p:sld xmlns:a="http://schemas.openxmlformats.org/drawingml/2006/main" xmlns:r="http://schemas.openxmlformats.org/officeDocument/2006/relationships" xmlns:p="http://schemas.openxmlformats.org/presentationml/2006/main">
+  <p:cSld>
+    <p:spTree>
+      <p:nvGrpSpPr>
+        <p:cNvPr id="1" name=""/>
+        <p:cNvGrpSpPr/>
+        <p:nvPr/>
+      </p:nvGrpSpPr>
+      <p:grpSpPr>
+        <a:xfrm>
+          <a:off x="0" y="0"/>
+          <a:ext cx="0" cy="0"/>
+          <a:chOff x="0" y="0"/>
+          <a:chExt cx="0" cy="0"/>
+        </a:xfrm>
+      </p:grpSpPr>
+      <p:sp>
+        <p:nvSpPr>
+          <p:cNvPr id="2" name="Titel 1">
+            <a:extLst>
+              <a:ext uri="{FF2B5EF4-FFF2-40B4-BE49-F238E27FC236}">
+                <a16:creationId xmlns:a16="http://schemas.microsoft.com/office/drawing/2014/main" id="{5FE68724-AEE1-410A-A646-EBF5BFF66344}"/>
+              </a:ext>
+            </a:extLst>
+          </p:cNvPr>
+          <p:cNvSpPr>
+            <a:spLocks noGrp="1"/>
+          </p:cNvSpPr>
+          <p:nvPr>
+            <p:ph type="title"/>
+          </p:nvPr>
+        </p:nvSpPr>
+        <p:spPr/>
+        <p:txBody>
+          <a:bodyPr/>
+          <a:lstStyle/>
+          <a:p>
+            <a:r>
+              <a:rPr lang="de-DE"/>
+              <a:t>Latency Test Framework</a:t>
+            </a:r>
+            <a:endParaRPr lang="en-US"/>
+          </a:p>
+        </p:txBody>
+      </p:sp>
+      <p:sp>
+        <p:nvSpPr>
+          <p:cNvPr id="4" name="Foliennummernplatzhalter 3">
+            <a:extLst>
+              <a:ext uri="{FF2B5EF4-FFF2-40B4-BE49-F238E27FC236}">
+                <a16:creationId xmlns:a16="http://schemas.microsoft.com/office/drawing/2014/main" id="{5DFDBFB6-BAC4-41BB-87E0-7CD02CAD6D17}"/>
+              </a:ext>
+            </a:extLst>
+          </p:cNvPr>
+          <p:cNvSpPr>
+            <a:spLocks noGrp="1"/>
+          </p:cNvSpPr>
+          <p:nvPr>
+            <p:ph type="sldNum" sz="quarter" idx="10"/>
+          </p:nvPr>
+        </p:nvSpPr>
+        <p:spPr/>
+        <p:txBody>
+          <a:bodyPr/>
+          <a:lstStyle/>
+          <a:p>
+            <a:fld id="{9BBAE405-9238-4745-AB75-58013C9D9462}" type="slidenum">
+              <a:rPr lang="de-DE" smtClean="0"/>
+              <a:t>7</a:t>
+            </a:fld>
+            <a:endParaRPr lang="de-DE" dirty="0"/>
+          </a:p>
+        </p:txBody>
+      </p:sp>
+      <p:pic>
+        <p:nvPicPr>
+          <p:cNvPr id="6" name="Inhaltsplatzhalter 5" descr="Ein Bild, das Boden, legend enthält.&#10;&#10;Automatisch generierte Beschreibung">
+            <a:extLst>
+              <a:ext uri="{FF2B5EF4-FFF2-40B4-BE49-F238E27FC236}">
+                <a16:creationId xmlns:a16="http://schemas.microsoft.com/office/drawing/2014/main" id="{24A021A2-D1AD-45F0-A1FF-977219573AED}"/>
+              </a:ext>
+            </a:extLst>
+          </p:cNvPr>
+          <p:cNvPicPr>
+            <a:picLocks noGrp="1" noChangeAspect="1"/>
+          </p:cNvPicPr>
+          <p:nvPr>
+            <p:ph sz="half" idx="1"/>
+          </p:nvPr>
+        </p:nvPicPr>
+        <p:blipFill>
+          <a:blip r:embed="rId2" cstate="print">
+            <a:extLst>
+              <a:ext uri="{28A0092B-C50C-407E-A947-70E740481C1C}">
+                <a14:useLocalDpi xmlns:a14="http://schemas.microsoft.com/office/drawing/2010/main" val="0"/>
+              </a:ext>
+            </a:extLst>
+          </a:blip>
+          <a:stretch>
+            <a:fillRect/>
+          </a:stretch>
+        </p:blipFill>
+        <p:spPr>
+          <a:xfrm>
+            <a:off x="2293471" y="2339975"/>
+            <a:ext cx="5277783" cy="3960813"/>
+          </a:xfrm>
+        </p:spPr>
+      </p:pic>
+    </p:spTree>
+    <p:extLst>
+      <p:ext uri="{BB962C8B-B14F-4D97-AF65-F5344CB8AC3E}">
+        <p14:creationId xmlns:p14="http://schemas.microsoft.com/office/powerpoint/2010/main" val="3139764421"/>
+      </p:ext>
+    </p:extLst>
+  </p:cSld>
+  <p:clrMapOvr>
+    <a:masterClrMapping/>
+  </p:clrMapOvr>
+</p:sld>
+</file>
+
+<file path=ppt/slides/slide8.xml><?xml version="1.0" encoding="utf-8"?>
+<p:sld xmlns:a="http://schemas.openxmlformats.org/drawingml/2006/main" xmlns:r="http://schemas.openxmlformats.org/officeDocument/2006/relationships" xmlns:p="http://schemas.openxmlformats.org/presentationml/2006/main">
+  <p:cSld>
+    <p:spTree>
+      <p:nvGrpSpPr>
+        <p:cNvPr id="1" name=""/>
+        <p:cNvGrpSpPr/>
+        <p:nvPr/>
+      </p:nvGrpSpPr>
+      <p:grpSpPr>
+        <a:xfrm>
+          <a:off x="0" y="0"/>
+          <a:ext cx="0" cy="0"/>
+          <a:chOff x="0" y="0"/>
+          <a:chExt cx="0" cy="0"/>
+        </a:xfrm>
+      </p:grpSpPr>
+      <p:sp>
+        <p:nvSpPr>
+          <p:cNvPr id="2" name="Titel 1">
+            <a:extLst>
+              <a:ext uri="{FF2B5EF4-FFF2-40B4-BE49-F238E27FC236}">
+                <a16:creationId xmlns:a16="http://schemas.microsoft.com/office/drawing/2014/main" id="{5FE68724-AEE1-410A-A646-EBF5BFF66344}"/>
+              </a:ext>
+            </a:extLst>
+          </p:cNvPr>
+          <p:cNvSpPr>
+            <a:spLocks noGrp="1"/>
+          </p:cNvSpPr>
+          <p:nvPr>
+            <p:ph type="title"/>
+          </p:nvPr>
+        </p:nvSpPr>
+        <p:spPr/>
+        <p:txBody>
+          <a:bodyPr/>
+          <a:lstStyle/>
+          <a:p>
+            <a:r>
+              <a:rPr lang="de-DE"/>
+              <a:t>Latency Test Framework</a:t>
+            </a:r>
+            <a:endParaRPr lang="en-US"/>
+          </a:p>
+        </p:txBody>
+      </p:sp>
+      <p:sp>
+        <p:nvSpPr>
+          <p:cNvPr id="4" name="Foliennummernplatzhalter 3">
+            <a:extLst>
+              <a:ext uri="{FF2B5EF4-FFF2-40B4-BE49-F238E27FC236}">
+                <a16:creationId xmlns:a16="http://schemas.microsoft.com/office/drawing/2014/main" id="{5DFDBFB6-BAC4-41BB-87E0-7CD02CAD6D17}"/>
+              </a:ext>
+            </a:extLst>
+          </p:cNvPr>
+          <p:cNvSpPr>
+            <a:spLocks noGrp="1"/>
+          </p:cNvSpPr>
+          <p:nvPr>
+            <p:ph type="sldNum" sz="quarter" idx="10"/>
+          </p:nvPr>
+        </p:nvSpPr>
+        <p:spPr/>
+        <p:txBody>
+          <a:bodyPr/>
+          <a:lstStyle/>
+          <a:p>
+            <a:fld id="{9BBAE405-9238-4745-AB75-58013C9D9462}" type="slidenum">
+              <a:rPr lang="de-DE" smtClean="0"/>
+              <a:t>8</a:t>
+            </a:fld>
+            <a:endParaRPr lang="de-DE" dirty="0"/>
+          </a:p>
+        </p:txBody>
+      </p:sp>
+      <p:pic>
+        <p:nvPicPr>
+          <p:cNvPr id="8" name="Inhaltsplatzhalter 7" descr="Ein Bild, das Computer, Tastatur, drinnen, Tisch enthält.&#10;&#10;Automatisch generierte Beschreibung">
+            <a:extLst>
+              <a:ext uri="{FF2B5EF4-FFF2-40B4-BE49-F238E27FC236}">
+                <a16:creationId xmlns:a16="http://schemas.microsoft.com/office/drawing/2014/main" id="{2B52E787-676A-4F05-A4AF-EDF78F7B1F49}"/>
+              </a:ext>
+            </a:extLst>
+          </p:cNvPr>
+          <p:cNvPicPr>
+            <a:picLocks noGrp="1" noChangeAspect="1"/>
+          </p:cNvPicPr>
+          <p:nvPr>
+            <p:ph sz="half" idx="1"/>
+          </p:nvPr>
+        </p:nvPicPr>
+        <p:blipFill>
+          <a:blip r:embed="rId2" cstate="print">
+            <a:extLst>
+              <a:ext uri="{28A0092B-C50C-407E-A947-70E740481C1C}">
+                <a14:useLocalDpi xmlns:a14="http://schemas.microsoft.com/office/drawing/2010/main" val="0"/>
+              </a:ext>
+            </a:extLst>
+          </a:blip>
+          <a:stretch>
+            <a:fillRect/>
+          </a:stretch>
+        </p:blipFill>
+        <p:spPr>
+          <a:xfrm>
+            <a:off x="3446129" y="2339975"/>
+            <a:ext cx="2972467" cy="3960813"/>
+          </a:xfrm>
+        </p:spPr>
+      </p:pic>
+    </p:spTree>
+    <p:extLst>
+      <p:ext uri="{BB962C8B-B14F-4D97-AF65-F5344CB8AC3E}">
+        <p14:creationId xmlns:p14="http://schemas.microsoft.com/office/powerpoint/2010/main" val="3960380277"/>
+      </p:ext>
+    </p:extLst>
+  </p:cSld>
+  <p:clrMapOvr>
+    <a:masterClrMapping/>
+  </p:clrMapOvr>
+</p:sld>
+</file>
+
+<file path=ppt/slides/slide9.xml><?xml version="1.0" encoding="utf-8"?>
+<p:sld xmlns:a="http://schemas.openxmlformats.org/drawingml/2006/main" xmlns:r="http://schemas.openxmlformats.org/officeDocument/2006/relationships" xmlns:p="http://schemas.openxmlformats.org/presentationml/2006/main">
+  <p:cSld>
+    <p:spTree>
+      <p:nvGrpSpPr>
+        <p:cNvPr id="1" name=""/>
+        <p:cNvGrpSpPr/>
+        <p:nvPr/>
+      </p:nvGrpSpPr>
+      <p:grpSpPr>
+        <a:xfrm>
+          <a:off x="0" y="0"/>
+          <a:ext cx="0" cy="0"/>
+          <a:chOff x="0" y="0"/>
+          <a:chExt cx="0" cy="0"/>
+        </a:xfrm>
+      </p:grpSpPr>
+      <p:sp>
+        <p:nvSpPr>
+          <p:cNvPr id="2" name="Titel 1">
+            <a:extLst>
+              <a:ext uri="{FF2B5EF4-FFF2-40B4-BE49-F238E27FC236}">
+                <a16:creationId xmlns:a16="http://schemas.microsoft.com/office/drawing/2014/main" id="{5FE68724-AEE1-410A-A646-EBF5BFF66344}"/>
+              </a:ext>
+            </a:extLst>
+          </p:cNvPr>
+          <p:cNvSpPr>
+            <a:spLocks noGrp="1"/>
+          </p:cNvSpPr>
+          <p:nvPr>
+            <p:ph type="title"/>
+          </p:nvPr>
+        </p:nvSpPr>
+        <p:spPr/>
+        <p:txBody>
+          <a:bodyPr/>
+          <a:lstStyle/>
+          <a:p>
+            <a:r>
+              <a:rPr lang="de-DE"/>
+              <a:t>Latency Test Framework</a:t>
+            </a:r>
+            <a:endParaRPr lang="en-US"/>
+          </a:p>
+        </p:txBody>
+      </p:sp>
+      <p:sp>
+        <p:nvSpPr>
+          <p:cNvPr id="4" name="Foliennummernplatzhalter 3">
+            <a:extLst>
+              <a:ext uri="{FF2B5EF4-FFF2-40B4-BE49-F238E27FC236}">
+                <a16:creationId xmlns:a16="http://schemas.microsoft.com/office/drawing/2014/main" id="{5DFDBFB6-BAC4-41BB-87E0-7CD02CAD6D17}"/>
+              </a:ext>
+            </a:extLst>
+          </p:cNvPr>
+          <p:cNvSpPr>
+            <a:spLocks noGrp="1"/>
+          </p:cNvSpPr>
+          <p:nvPr>
+            <p:ph type="sldNum" sz="quarter" idx="10"/>
+          </p:nvPr>
+        </p:nvSpPr>
+        <p:spPr/>
+        <p:txBody>
+          <a:bodyPr/>
+          <a:lstStyle/>
+          <a:p>
+            <a:fld id="{9BBAE405-9238-4745-AB75-58013C9D9462}" type="slidenum">
+              <a:rPr lang="de-DE" smtClean="0"/>
+              <a:t>9</a:t>
+            </a:fld>
+            <a:endParaRPr lang="de-DE" dirty="0"/>
+          </a:p>
+        </p:txBody>
+      </p:sp>
+      <p:pic>
+        <p:nvPicPr>
+          <p:cNvPr id="6" name="Inhaltsplatzhalter 5" descr="Ein Bild, das Tastatur, Computer, drinnen, Elektronik enthält.&#10;&#10;Automatisch generierte Beschreibung">
+            <a:extLst>
+              <a:ext uri="{FF2B5EF4-FFF2-40B4-BE49-F238E27FC236}">
+                <a16:creationId xmlns:a16="http://schemas.microsoft.com/office/drawing/2014/main" id="{CB2AA74B-2A1E-4174-9B7A-2D93FE2B03CA}"/>
+              </a:ext>
+            </a:extLst>
+          </p:cNvPr>
+          <p:cNvPicPr>
+            <a:picLocks noGrp="1" noChangeAspect="1"/>
+          </p:cNvPicPr>
+          <p:nvPr>
+            <p:ph sz="half" idx="1"/>
+          </p:nvPr>
+        </p:nvPicPr>
+        <p:blipFill>
+          <a:blip r:embed="rId2" cstate="print">
+            <a:extLst>
+              <a:ext uri="{28A0092B-C50C-407E-A947-70E740481C1C}">
+                <a14:useLocalDpi xmlns:a14="http://schemas.microsoft.com/office/drawing/2010/main" val="0"/>
+              </a:ext>
+            </a:extLst>
+          </a:blip>
+          <a:stretch>
+            <a:fillRect/>
+          </a:stretch>
+        </p:blipFill>
+        <p:spPr>
+          <a:xfrm>
+            <a:off x="3446129" y="2339975"/>
+            <a:ext cx="2972467" cy="3960813"/>
+          </a:xfrm>
+        </p:spPr>
+      </p:pic>
+    </p:spTree>
+    <p:extLst>
+      <p:ext uri="{BB962C8B-B14F-4D97-AF65-F5344CB8AC3E}">
+        <p14:creationId xmlns:p14="http://schemas.microsoft.com/office/powerpoint/2010/main" val="2111250581"/>
       </p:ext>
     </p:extLst>
   </p:cSld>

</xml_diff>

<commit_message>
Upateing ppt and adding pdf
</commit_message>
<xml_diff>
--- a/02-status-reports/20190606/fehle_halbhuber_sasse_predict_vr_movement.pptx
+++ b/02-status-reports/20190606/fehle_halbhuber_sasse_predict_vr_movement.pptx
@@ -5,10 +5,10 @@
     <p:sldMasterId id="2147483648" r:id="rId1"/>
   </p:sldMasterIdLst>
   <p:notesMasterIdLst>
-    <p:notesMasterId r:id="rId16"/>
+    <p:notesMasterId r:id="rId17"/>
   </p:notesMasterIdLst>
   <p:handoutMasterIdLst>
-    <p:handoutMasterId r:id="rId17"/>
+    <p:handoutMasterId r:id="rId18"/>
   </p:handoutMasterIdLst>
   <p:sldIdLst>
     <p:sldId id="258" r:id="rId2"/>
@@ -23,8 +23,9 @@
     <p:sldId id="289" r:id="rId11"/>
     <p:sldId id="290" r:id="rId12"/>
     <p:sldId id="291" r:id="rId13"/>
-    <p:sldId id="277" r:id="rId14"/>
-    <p:sldId id="273" r:id="rId15"/>
+    <p:sldId id="292" r:id="rId14"/>
+    <p:sldId id="277" r:id="rId15"/>
+    <p:sldId id="273" r:id="rId16"/>
   </p:sldIdLst>
   <p:sldSz cx="9144000" cy="6858000" type="screen4x3"/>
   <p:notesSz cx="6858000" cy="9144000"/>
@@ -140,6 +141,7 @@
             <p14:sldId id="289"/>
             <p14:sldId id="290"/>
             <p14:sldId id="291"/>
+            <p14:sldId id="292"/>
             <p14:sldId id="277"/>
           </p14:sldIdLst>
         </p14:section>
@@ -344,7 +346,7 @@
             <a:fld id="{D43DEED9-C1BB-4DBE-A071-13CC6F6B90F4}" type="slidenum">
               <a:rPr lang="de-DE" smtClean="0"/>
               <a:pPr/>
-              <a:t>‹Nr.›</a:t>
+              <a:t>‹#›</a:t>
             </a:fld>
             <a:endParaRPr lang="de-DE"/>
           </a:p>
@@ -600,7 +602,7 @@
             <a:fld id="{C7C1E745-E753-4EB9-8485-6560CD204B37}" type="slidenum">
               <a:rPr lang="de-DE" smtClean="0"/>
               <a:pPr/>
-              <a:t>‹Nr.›</a:t>
+              <a:t>‹#›</a:t>
             </a:fld>
             <a:endParaRPr lang="de-DE"/>
           </a:p>
@@ -859,7 +861,7 @@
             <a:fld id="{C7C1E745-E753-4EB9-8485-6560CD204B37}" type="slidenum">
               <a:rPr lang="de-DE" smtClean="0"/>
               <a:pPr/>
-              <a:t>13</a:t>
+              <a:t>14</a:t>
             </a:fld>
             <a:endParaRPr lang="de-DE"/>
           </a:p>
@@ -1535,7 +1537,7 @@
           <a:p>
             <a:fld id="{9BBAE405-9238-4745-AB75-58013C9D9462}" type="slidenum">
               <a:rPr lang="de-DE" smtClean="0"/>
-              <a:t>‹Nr.›</a:t>
+              <a:t>‹#›</a:t>
             </a:fld>
             <a:endParaRPr lang="de-DE" dirty="0"/>
           </a:p>
@@ -2356,7 +2358,7 @@
           <a:p>
             <a:fld id="{9BBAE405-9238-4745-AB75-58013C9D9462}" type="slidenum">
               <a:rPr lang="de-DE" smtClean="0"/>
-              <a:t>‹Nr.›</a:t>
+              <a:t>‹#›</a:t>
             </a:fld>
             <a:endParaRPr lang="de-DE" dirty="0"/>
           </a:p>
@@ -3122,10 +3124,10 @@
       </p:grpSpPr>
       <p:sp>
         <p:nvSpPr>
-          <p:cNvPr id="2" name="Titel 1">
+          <p:cNvPr id="2" name="Title 1">
             <a:extLst>
               <a:ext uri="{FF2B5EF4-FFF2-40B4-BE49-F238E27FC236}">
-                <a16:creationId xmlns:a16="http://schemas.microsoft.com/office/drawing/2014/main" id="{2A42FEB0-5048-4439-BF38-0C19C3532315}"/>
+                <a16:creationId xmlns:a16="http://schemas.microsoft.com/office/drawing/2014/main" id="{EF41D4D0-02BB-4F65-8C09-A36871123C7A}"/>
               </a:ext>
             </a:extLst>
           </p:cNvPr>
@@ -3142,19 +3144,18 @@
           <a:lstStyle/>
           <a:p>
             <a:r>
-              <a:rPr lang="de-DE"/>
-              <a:t>Next Steps</a:t>
+              <a:rPr lang="de-DE" dirty="0"/>
+              <a:t>Python Interface</a:t>
             </a:r>
-            <a:endParaRPr lang="de-DE" dirty="0"/>
-          </a:p>
-        </p:txBody>
-      </p:sp>
-      <p:sp>
-        <p:nvSpPr>
-          <p:cNvPr id="4" name="Foliennummernplatzhalter 3">
+          </a:p>
+        </p:txBody>
+      </p:sp>
+      <p:sp>
+        <p:nvSpPr>
+          <p:cNvPr id="4" name="Slide Number Placeholder 3">
             <a:extLst>
               <a:ext uri="{FF2B5EF4-FFF2-40B4-BE49-F238E27FC236}">
-                <a16:creationId xmlns:a16="http://schemas.microsoft.com/office/drawing/2014/main" id="{4FCFF55B-CB17-417D-97C3-58B0E9907247}"/>
+                <a16:creationId xmlns:a16="http://schemas.microsoft.com/office/drawing/2014/main" id="{DF83920B-9BEF-4CBE-B2CB-ABE3B0F25B47}"/>
               </a:ext>
             </a:extLst>
           </p:cNvPr>
@@ -3180,68 +3181,376 @@
       </p:sp>
       <p:sp>
         <p:nvSpPr>
-          <p:cNvPr id="3" name="Inhaltsplatzhalter 2">
+          <p:cNvPr id="5" name="Rechteck: abgerundete Ecken 4">
             <a:extLst>
               <a:ext uri="{FF2B5EF4-FFF2-40B4-BE49-F238E27FC236}">
-                <a16:creationId xmlns:a16="http://schemas.microsoft.com/office/drawing/2014/main" id="{7181ACB9-754C-4256-8915-87AB78FCEF1F}"/>
+                <a16:creationId xmlns:a16="http://schemas.microsoft.com/office/drawing/2014/main" id="{FAF2EDE5-BD8E-4927-9743-9263C9FFABBB}"/>
               </a:ext>
             </a:extLst>
           </p:cNvPr>
-          <p:cNvSpPr>
-            <a:spLocks noGrp="1"/>
-          </p:cNvSpPr>
-          <p:nvPr>
-            <p:ph sz="half" idx="1"/>
-          </p:nvPr>
-        </p:nvSpPr>
-        <p:spPr/>
-        <p:txBody>
-          <a:bodyPr/>
+          <p:cNvSpPr/>
+          <p:nvPr/>
+        </p:nvSpPr>
+        <p:spPr>
+          <a:xfrm>
+            <a:off x="1219368" y="3132374"/>
+            <a:ext cx="1800200" cy="504056"/>
+          </a:xfrm>
+          <a:prstGeom prst="roundRect">
+            <a:avLst/>
+          </a:prstGeom>
+        </p:spPr>
+        <p:style>
+          <a:lnRef idx="2">
+            <a:schemeClr val="accent1">
+              <a:shade val="50000"/>
+            </a:schemeClr>
+          </a:lnRef>
+          <a:fillRef idx="1">
+            <a:schemeClr val="accent1"/>
+          </a:fillRef>
+          <a:effectRef idx="0">
+            <a:schemeClr val="accent1"/>
+          </a:effectRef>
+          <a:fontRef idx="minor">
+            <a:schemeClr val="lt1"/>
+          </a:fontRef>
+        </p:style>
+        <p:txBody>
+          <a:bodyPr rtlCol="0" anchor="ctr"/>
           <a:lstStyle/>
           <a:p>
-            <a:pPr>
-              <a:buFont typeface="Arial" panose="020B0604020202020204" pitchFamily="34" charset="0"/>
-              <a:buChar char="•"/>
-            </a:pPr>
+            <a:pPr algn="ctr"/>
+            <a:r>
+              <a:rPr lang="de-DE" dirty="0" err="1"/>
+              <a:t>OptiTrack</a:t>
+            </a:r>
             <a:endParaRPr lang="de-DE" dirty="0"/>
           </a:p>
-          <a:p>
-            <a:pPr>
-              <a:buFont typeface="Arial" panose="020B0604020202020204" pitchFamily="34" charset="0"/>
-              <a:buChar char="•"/>
-            </a:pPr>
-            <a:r>
-              <a:rPr lang="de-DE"/>
-              <a:t>Motion </a:t>
-            </a:r>
+        </p:txBody>
+      </p:sp>
+      <p:sp>
+        <p:nvSpPr>
+          <p:cNvPr id="6" name="Rechteck: abgerundete Ecken 5">
+            <a:extLst>
+              <a:ext uri="{FF2B5EF4-FFF2-40B4-BE49-F238E27FC236}">
+                <a16:creationId xmlns:a16="http://schemas.microsoft.com/office/drawing/2014/main" id="{3045C0D0-8417-495A-8CB0-B5C909E1BB58}"/>
+              </a:ext>
+            </a:extLst>
+          </p:cNvPr>
+          <p:cNvSpPr/>
+          <p:nvPr/>
+        </p:nvSpPr>
+        <p:spPr>
+          <a:xfrm>
+            <a:off x="3811656" y="3132374"/>
+            <a:ext cx="1800200" cy="504056"/>
+          </a:xfrm>
+          <a:prstGeom prst="roundRect">
+            <a:avLst/>
+          </a:prstGeom>
+        </p:spPr>
+        <p:style>
+          <a:lnRef idx="2">
+            <a:schemeClr val="accent2">
+              <a:shade val="50000"/>
+            </a:schemeClr>
+          </a:lnRef>
+          <a:fillRef idx="1">
+            <a:schemeClr val="accent2"/>
+          </a:fillRef>
+          <a:effectRef idx="0">
+            <a:schemeClr val="accent2"/>
+          </a:effectRef>
+          <a:fontRef idx="minor">
+            <a:schemeClr val="lt1"/>
+          </a:fontRef>
+        </p:style>
+        <p:txBody>
+          <a:bodyPr rtlCol="0" anchor="ctr"/>
+          <a:lstStyle/>
+          <a:p>
+            <a:pPr algn="ctr"/>
             <a:r>
               <a:rPr lang="de-DE" dirty="0"/>
-              <a:t>data acquisition framework</a:t>
+              <a:t>Python-Interface</a:t>
             </a:r>
           </a:p>
-          <a:p>
-            <a:pPr>
-              <a:buFont typeface="Arial" panose="020B0604020202020204" pitchFamily="34" charset="0"/>
-              <a:buChar char="•"/>
-            </a:pPr>
+        </p:txBody>
+      </p:sp>
+      <p:sp>
+        <p:nvSpPr>
+          <p:cNvPr id="7" name="Rechteck: abgerundete Ecken 6">
+            <a:extLst>
+              <a:ext uri="{FF2B5EF4-FFF2-40B4-BE49-F238E27FC236}">
+                <a16:creationId xmlns:a16="http://schemas.microsoft.com/office/drawing/2014/main" id="{899AE766-ACEB-4E03-A441-046F1CB2F0F2}"/>
+              </a:ext>
+            </a:extLst>
+          </p:cNvPr>
+          <p:cNvSpPr/>
+          <p:nvPr/>
+        </p:nvSpPr>
+        <p:spPr>
+          <a:xfrm>
+            <a:off x="6403944" y="3132374"/>
+            <a:ext cx="1800200" cy="504056"/>
+          </a:xfrm>
+          <a:prstGeom prst="roundRect">
+            <a:avLst/>
+          </a:prstGeom>
+        </p:spPr>
+        <p:style>
+          <a:lnRef idx="2">
+            <a:schemeClr val="accent1">
+              <a:shade val="50000"/>
+            </a:schemeClr>
+          </a:lnRef>
+          <a:fillRef idx="1">
+            <a:schemeClr val="accent1"/>
+          </a:fillRef>
+          <a:effectRef idx="0">
+            <a:schemeClr val="accent1"/>
+          </a:effectRef>
+          <a:fontRef idx="minor">
+            <a:schemeClr val="lt1"/>
+          </a:fontRef>
+        </p:style>
+        <p:txBody>
+          <a:bodyPr rtlCol="0" anchor="ctr"/>
+          <a:lstStyle/>
+          <a:p>
+            <a:pPr algn="ctr"/>
+            <a:r>
+              <a:rPr lang="de-DE" dirty="0"/>
+              <a:t>Unity</a:t>
+            </a:r>
+          </a:p>
+        </p:txBody>
+      </p:sp>
+      <p:sp>
+        <p:nvSpPr>
+          <p:cNvPr id="8" name="Rechteck: abgerundete Ecken 7">
+            <a:extLst>
+              <a:ext uri="{FF2B5EF4-FFF2-40B4-BE49-F238E27FC236}">
+                <a16:creationId xmlns:a16="http://schemas.microsoft.com/office/drawing/2014/main" id="{C6776E5D-3D2D-4A46-9685-FB8B95236D4E}"/>
+              </a:ext>
+            </a:extLst>
+          </p:cNvPr>
+          <p:cNvSpPr/>
+          <p:nvPr/>
+        </p:nvSpPr>
+        <p:spPr>
+          <a:xfrm>
+            <a:off x="3811656" y="4142894"/>
+            <a:ext cx="1800200" cy="504056"/>
+          </a:xfrm>
+          <a:prstGeom prst="roundRect">
+            <a:avLst/>
+          </a:prstGeom>
+        </p:spPr>
+        <p:style>
+          <a:lnRef idx="2">
+            <a:schemeClr val="accent2">
+              <a:shade val="50000"/>
+            </a:schemeClr>
+          </a:lnRef>
+          <a:fillRef idx="1">
+            <a:schemeClr val="accent2"/>
+          </a:fillRef>
+          <a:effectRef idx="0">
+            <a:schemeClr val="accent2"/>
+          </a:effectRef>
+          <a:fontRef idx="minor">
+            <a:schemeClr val="lt1"/>
+          </a:fontRef>
+        </p:style>
+        <p:txBody>
+          <a:bodyPr rtlCol="0" anchor="ctr"/>
+          <a:lstStyle/>
+          <a:p>
+            <a:pPr algn="ctr"/>
+            <a:r>
+              <a:rPr lang="de-DE" dirty="0" err="1"/>
+              <a:t>Prediction</a:t>
+            </a:r>
             <a:endParaRPr lang="de-DE" dirty="0"/>
           </a:p>
-          <a:p>
-            <a:pPr>
-              <a:buFont typeface="Arial" panose="020B0604020202020204" pitchFamily="34" charset="0"/>
-              <a:buChar char="•"/>
-            </a:pPr>
-            <a:r>
-              <a:rPr lang="en-US" dirty="0"/>
-              <a:t>Gathering test data for NN training</a:t>
-            </a:r>
-          </a:p>
-        </p:txBody>
-      </p:sp>
+        </p:txBody>
+      </p:sp>
+      <p:cxnSp>
+        <p:nvCxnSpPr>
+          <p:cNvPr id="9" name="Verbinder: gewinkelt 11">
+            <a:extLst>
+              <a:ext uri="{FF2B5EF4-FFF2-40B4-BE49-F238E27FC236}">
+                <a16:creationId xmlns:a16="http://schemas.microsoft.com/office/drawing/2014/main" id="{16CFF166-888E-436B-A77C-30515FD744DB}"/>
+              </a:ext>
+            </a:extLst>
+          </p:cNvPr>
+          <p:cNvCxnSpPr>
+            <a:stCxn id="5" idx="0"/>
+            <a:endCxn id="7" idx="0"/>
+          </p:cNvCxnSpPr>
+          <p:nvPr/>
+        </p:nvCxnSpPr>
+        <p:spPr>
+          <a:xfrm rot="5400000" flipH="1" flipV="1">
+            <a:off x="4711756" y="540086"/>
+            <a:ext cx="12700" cy="5184576"/>
+          </a:xfrm>
+          <a:prstGeom prst="bentConnector3">
+            <a:avLst>
+              <a:gd name="adj1" fmla="val 1800000"/>
+            </a:avLst>
+          </a:prstGeom>
+          <a:ln>
+            <a:tailEnd type="triangle"/>
+          </a:ln>
+        </p:spPr>
+        <p:style>
+          <a:lnRef idx="2">
+            <a:schemeClr val="accent1"/>
+          </a:lnRef>
+          <a:fillRef idx="0">
+            <a:schemeClr val="accent1"/>
+          </a:fillRef>
+          <a:effectRef idx="1">
+            <a:schemeClr val="accent1"/>
+          </a:effectRef>
+          <a:fontRef idx="minor">
+            <a:schemeClr val="tx1"/>
+          </a:fontRef>
+        </p:style>
+      </p:cxnSp>
+      <p:cxnSp>
+        <p:nvCxnSpPr>
+          <p:cNvPr id="10" name="Gerade Verbindung mit Pfeil 13">
+            <a:extLst>
+              <a:ext uri="{FF2B5EF4-FFF2-40B4-BE49-F238E27FC236}">
+                <a16:creationId xmlns:a16="http://schemas.microsoft.com/office/drawing/2014/main" id="{80192DA7-25D2-4724-A0E6-9B1C3800738B}"/>
+              </a:ext>
+            </a:extLst>
+          </p:cNvPr>
+          <p:cNvCxnSpPr>
+            <a:stCxn id="5" idx="3"/>
+            <a:endCxn id="6" idx="1"/>
+          </p:cNvCxnSpPr>
+          <p:nvPr/>
+        </p:nvCxnSpPr>
+        <p:spPr>
+          <a:xfrm>
+            <a:off x="3019568" y="3384402"/>
+            <a:ext cx="792088" cy="0"/>
+          </a:xfrm>
+          <a:prstGeom prst="straightConnector1">
+            <a:avLst/>
+          </a:prstGeom>
+          <a:ln>
+            <a:tailEnd type="triangle"/>
+          </a:ln>
+        </p:spPr>
+        <p:style>
+          <a:lnRef idx="2">
+            <a:schemeClr val="accent2"/>
+          </a:lnRef>
+          <a:fillRef idx="0">
+            <a:schemeClr val="accent2"/>
+          </a:fillRef>
+          <a:effectRef idx="1">
+            <a:schemeClr val="accent2"/>
+          </a:effectRef>
+          <a:fontRef idx="minor">
+            <a:schemeClr val="tx1"/>
+          </a:fontRef>
+        </p:style>
+      </p:cxnSp>
+      <p:cxnSp>
+        <p:nvCxnSpPr>
+          <p:cNvPr id="11" name="Gerade Verbindung mit Pfeil 15">
+            <a:extLst>
+              <a:ext uri="{FF2B5EF4-FFF2-40B4-BE49-F238E27FC236}">
+                <a16:creationId xmlns:a16="http://schemas.microsoft.com/office/drawing/2014/main" id="{C50BADE1-3756-45C4-A008-AA9A1A5F730C}"/>
+              </a:ext>
+            </a:extLst>
+          </p:cNvPr>
+          <p:cNvCxnSpPr>
+            <a:stCxn id="6" idx="2"/>
+            <a:endCxn id="8" idx="0"/>
+          </p:cNvCxnSpPr>
+          <p:nvPr/>
+        </p:nvCxnSpPr>
+        <p:spPr>
+          <a:xfrm>
+            <a:off x="4711756" y="3636430"/>
+            <a:ext cx="0" cy="506464"/>
+          </a:xfrm>
+          <a:prstGeom prst="straightConnector1">
+            <a:avLst/>
+          </a:prstGeom>
+          <a:ln>
+            <a:tailEnd type="triangle"/>
+          </a:ln>
+        </p:spPr>
+        <p:style>
+          <a:lnRef idx="2">
+            <a:schemeClr val="accent2"/>
+          </a:lnRef>
+          <a:fillRef idx="0">
+            <a:schemeClr val="accent2"/>
+          </a:fillRef>
+          <a:effectRef idx="1">
+            <a:schemeClr val="accent2"/>
+          </a:effectRef>
+          <a:fontRef idx="minor">
+            <a:schemeClr val="tx1"/>
+          </a:fontRef>
+        </p:style>
+      </p:cxnSp>
+      <p:cxnSp>
+        <p:nvCxnSpPr>
+          <p:cNvPr id="12" name="Verbinder: gewinkelt 19">
+            <a:extLst>
+              <a:ext uri="{FF2B5EF4-FFF2-40B4-BE49-F238E27FC236}">
+                <a16:creationId xmlns:a16="http://schemas.microsoft.com/office/drawing/2014/main" id="{EA4D8365-89C6-44BC-A0BC-AFB30DF7E3FA}"/>
+              </a:ext>
+            </a:extLst>
+          </p:cNvPr>
+          <p:cNvCxnSpPr>
+            <a:stCxn id="8" idx="3"/>
+            <a:endCxn id="7" idx="2"/>
+          </p:cNvCxnSpPr>
+          <p:nvPr/>
+        </p:nvCxnSpPr>
+        <p:spPr>
+          <a:xfrm flipV="1">
+            <a:off x="5611856" y="3636430"/>
+            <a:ext cx="1692188" cy="758492"/>
+          </a:xfrm>
+          <a:prstGeom prst="bentConnector2">
+            <a:avLst/>
+          </a:prstGeom>
+          <a:ln>
+            <a:tailEnd type="triangle"/>
+          </a:ln>
+        </p:spPr>
+        <p:style>
+          <a:lnRef idx="2">
+            <a:schemeClr val="accent2"/>
+          </a:lnRef>
+          <a:fillRef idx="0">
+            <a:schemeClr val="accent2"/>
+          </a:fillRef>
+          <a:effectRef idx="1">
+            <a:schemeClr val="accent2"/>
+          </a:effectRef>
+          <a:fontRef idx="minor">
+            <a:schemeClr val="tx1"/>
+          </a:fontRef>
+        </p:style>
+      </p:cxnSp>
     </p:spTree>
     <p:extLst>
       <p:ext uri="{BB962C8B-B14F-4D97-AF65-F5344CB8AC3E}">
-        <p14:creationId xmlns:p14="http://schemas.microsoft.com/office/powerpoint/2010/main" val="3341079957"/>
+        <p14:creationId xmlns:p14="http://schemas.microsoft.com/office/powerpoint/2010/main" val="169828271"/>
       </p:ext>
     </p:extLst>
   </p:cSld>
@@ -3270,6 +3579,167 @@
       </p:grpSpPr>
       <p:sp>
         <p:nvSpPr>
+          <p:cNvPr id="2" name="Titel 1">
+            <a:extLst>
+              <a:ext uri="{FF2B5EF4-FFF2-40B4-BE49-F238E27FC236}">
+                <a16:creationId xmlns:a16="http://schemas.microsoft.com/office/drawing/2014/main" id="{2A42FEB0-5048-4439-BF38-0C19C3532315}"/>
+              </a:ext>
+            </a:extLst>
+          </p:cNvPr>
+          <p:cNvSpPr>
+            <a:spLocks noGrp="1"/>
+          </p:cNvSpPr>
+          <p:nvPr>
+            <p:ph type="title"/>
+          </p:nvPr>
+        </p:nvSpPr>
+        <p:spPr/>
+        <p:txBody>
+          <a:bodyPr/>
+          <a:lstStyle/>
+          <a:p>
+            <a:r>
+              <a:rPr lang="de-DE"/>
+              <a:t>Next Steps</a:t>
+            </a:r>
+            <a:endParaRPr lang="de-DE" dirty="0"/>
+          </a:p>
+        </p:txBody>
+      </p:sp>
+      <p:sp>
+        <p:nvSpPr>
+          <p:cNvPr id="4" name="Foliennummernplatzhalter 3">
+            <a:extLst>
+              <a:ext uri="{FF2B5EF4-FFF2-40B4-BE49-F238E27FC236}">
+                <a16:creationId xmlns:a16="http://schemas.microsoft.com/office/drawing/2014/main" id="{4FCFF55B-CB17-417D-97C3-58B0E9907247}"/>
+              </a:ext>
+            </a:extLst>
+          </p:cNvPr>
+          <p:cNvSpPr>
+            <a:spLocks noGrp="1"/>
+          </p:cNvSpPr>
+          <p:nvPr>
+            <p:ph type="sldNum" sz="quarter" idx="10"/>
+          </p:nvPr>
+        </p:nvSpPr>
+        <p:spPr/>
+        <p:txBody>
+          <a:bodyPr/>
+          <a:lstStyle/>
+          <a:p>
+            <a:fld id="{9BBAE405-9238-4745-AB75-58013C9D9462}" type="slidenum">
+              <a:rPr lang="de-DE" smtClean="0"/>
+              <a:t>14</a:t>
+            </a:fld>
+            <a:endParaRPr lang="de-DE" dirty="0"/>
+          </a:p>
+        </p:txBody>
+      </p:sp>
+      <p:sp>
+        <p:nvSpPr>
+          <p:cNvPr id="3" name="Inhaltsplatzhalter 2">
+            <a:extLst>
+              <a:ext uri="{FF2B5EF4-FFF2-40B4-BE49-F238E27FC236}">
+                <a16:creationId xmlns:a16="http://schemas.microsoft.com/office/drawing/2014/main" id="{7181ACB9-754C-4256-8915-87AB78FCEF1F}"/>
+              </a:ext>
+            </a:extLst>
+          </p:cNvPr>
+          <p:cNvSpPr>
+            <a:spLocks noGrp="1"/>
+          </p:cNvSpPr>
+          <p:nvPr>
+            <p:ph sz="half" idx="1"/>
+          </p:nvPr>
+        </p:nvSpPr>
+        <p:spPr/>
+        <p:txBody>
+          <a:bodyPr/>
+          <a:lstStyle/>
+          <a:p>
+            <a:pPr>
+              <a:buFont typeface="Arial" panose="020B0604020202020204" pitchFamily="34" charset="0"/>
+              <a:buChar char="•"/>
+            </a:pPr>
+            <a:endParaRPr lang="de-DE" dirty="0"/>
+          </a:p>
+          <a:p>
+            <a:pPr>
+              <a:buFont typeface="Arial" panose="020B0604020202020204" pitchFamily="34" charset="0"/>
+              <a:buChar char="•"/>
+            </a:pPr>
+            <a:r>
+              <a:rPr lang="de-DE" dirty="0"/>
+              <a:t>Performing the latency test series</a:t>
+            </a:r>
+          </a:p>
+          <a:p>
+            <a:pPr>
+              <a:buFont typeface="Arial" panose="020B0604020202020204" pitchFamily="34" charset="0"/>
+              <a:buChar char="•"/>
+            </a:pPr>
+            <a:endParaRPr lang="de-DE" dirty="0"/>
+          </a:p>
+          <a:p>
+            <a:pPr>
+              <a:buFont typeface="Arial" panose="020B0604020202020204" pitchFamily="34" charset="0"/>
+              <a:buChar char="•"/>
+            </a:pPr>
+            <a:r>
+              <a:rPr lang="de-DE" dirty="0"/>
+              <a:t>Motion data acquisition framework</a:t>
+            </a:r>
+          </a:p>
+          <a:p>
+            <a:pPr>
+              <a:buFont typeface="Arial" panose="020B0604020202020204" pitchFamily="34" charset="0"/>
+              <a:buChar char="•"/>
+            </a:pPr>
+            <a:endParaRPr lang="de-DE" dirty="0"/>
+          </a:p>
+          <a:p>
+            <a:pPr>
+              <a:buFont typeface="Arial" panose="020B0604020202020204" pitchFamily="34" charset="0"/>
+              <a:buChar char="•"/>
+            </a:pPr>
+            <a:r>
+              <a:rPr lang="en-US" dirty="0"/>
+              <a:t>Gathering test data for NN training</a:t>
+            </a:r>
+          </a:p>
+        </p:txBody>
+      </p:sp>
+    </p:spTree>
+    <p:extLst>
+      <p:ext uri="{BB962C8B-B14F-4D97-AF65-F5344CB8AC3E}">
+        <p14:creationId xmlns:p14="http://schemas.microsoft.com/office/powerpoint/2010/main" val="3341079957"/>
+      </p:ext>
+    </p:extLst>
+  </p:cSld>
+  <p:clrMapOvr>
+    <a:masterClrMapping/>
+  </p:clrMapOvr>
+</p:sld>
+</file>
+
+<file path=ppt/slides/slide15.xml><?xml version="1.0" encoding="utf-8"?>
+<p:sld xmlns:a="http://schemas.openxmlformats.org/drawingml/2006/main" xmlns:r="http://schemas.openxmlformats.org/officeDocument/2006/relationships" xmlns:p="http://schemas.openxmlformats.org/presentationml/2006/main">
+  <p:cSld>
+    <p:spTree>
+      <p:nvGrpSpPr>
+        <p:cNvPr id="1" name=""/>
+        <p:cNvGrpSpPr/>
+        <p:nvPr/>
+      </p:nvGrpSpPr>
+      <p:grpSpPr>
+        <a:xfrm>
+          <a:off x="0" y="0"/>
+          <a:ext cx="0" cy="0"/>
+          <a:chOff x="0" y="0"/>
+          <a:chExt cx="0" cy="0"/>
+        </a:xfrm>
+      </p:grpSpPr>
+      <p:sp>
+        <p:nvSpPr>
           <p:cNvPr id="5" name="Titel 4">
             <a:extLst>
               <a:ext uri="{FF2B5EF4-FFF2-40B4-BE49-F238E27FC236}">
@@ -3338,7 +3808,7 @@
           <a:p>
             <a:fld id="{9BBAE405-9238-4745-AB75-58013C9D9462}" type="slidenum">
               <a:rPr lang="de-DE" smtClean="0"/>
-              <a:t>14</a:t>
+              <a:t>15</a:t>
             </a:fld>
             <a:endParaRPr lang="de-DE" dirty="0"/>
           </a:p>

</xml_diff>